<commit_message>
added results from rotary centering scan with source centered above p+ contact and rotated to about 60 deg
</commit_message>
<xml_diff>
--- a/drawings/rotaryCentering.pptx
+++ b/drawings/rotaryCentering.pptx
@@ -11,6 +11,9 @@
     <p:sldId id="260" r:id="rId5"/>
     <p:sldId id="261" r:id="rId6"/>
     <p:sldId id="263" r:id="rId7"/>
+    <p:sldId id="264" r:id="rId8"/>
+    <p:sldId id="265" r:id="rId9"/>
+    <p:sldId id="266" r:id="rId10"/>
   </p:sldIdLst>
   <p:sldSz cx="12192000" cy="6858000"/>
   <p:notesSz cx="6858000" cy="9144000"/>
@@ -264,7 +267,7 @@
           <a:p>
             <a:fld id="{6ABC15E7-57BD-6A49-A8D8-B7EF19C631B4}" type="datetimeFigureOut">
               <a:rPr lang="en-US" smtClean="0"/>
-              <a:t>3/9/21</a:t>
+              <a:t>3/12/21</a:t>
             </a:fld>
             <a:endParaRPr lang="en-US"/>
           </a:p>
@@ -434,7 +437,7 @@
           <a:p>
             <a:fld id="{6ABC15E7-57BD-6A49-A8D8-B7EF19C631B4}" type="datetimeFigureOut">
               <a:rPr lang="en-US" smtClean="0"/>
-              <a:t>3/9/21</a:t>
+              <a:t>3/12/21</a:t>
             </a:fld>
             <a:endParaRPr lang="en-US"/>
           </a:p>
@@ -614,7 +617,7 @@
           <a:p>
             <a:fld id="{6ABC15E7-57BD-6A49-A8D8-B7EF19C631B4}" type="datetimeFigureOut">
               <a:rPr lang="en-US" smtClean="0"/>
-              <a:t>3/9/21</a:t>
+              <a:t>3/12/21</a:t>
             </a:fld>
             <a:endParaRPr lang="en-US"/>
           </a:p>
@@ -784,7 +787,7 @@
           <a:p>
             <a:fld id="{6ABC15E7-57BD-6A49-A8D8-B7EF19C631B4}" type="datetimeFigureOut">
               <a:rPr lang="en-US" smtClean="0"/>
-              <a:t>3/9/21</a:t>
+              <a:t>3/12/21</a:t>
             </a:fld>
             <a:endParaRPr lang="en-US"/>
           </a:p>
@@ -1030,7 +1033,7 @@
           <a:p>
             <a:fld id="{6ABC15E7-57BD-6A49-A8D8-B7EF19C631B4}" type="datetimeFigureOut">
               <a:rPr lang="en-US" smtClean="0"/>
-              <a:t>3/9/21</a:t>
+              <a:t>3/12/21</a:t>
             </a:fld>
             <a:endParaRPr lang="en-US"/>
           </a:p>
@@ -1262,7 +1265,7 @@
           <a:p>
             <a:fld id="{6ABC15E7-57BD-6A49-A8D8-B7EF19C631B4}" type="datetimeFigureOut">
               <a:rPr lang="en-US" smtClean="0"/>
-              <a:t>3/9/21</a:t>
+              <a:t>3/12/21</a:t>
             </a:fld>
             <a:endParaRPr lang="en-US"/>
           </a:p>
@@ -1629,7 +1632,7 @@
           <a:p>
             <a:fld id="{6ABC15E7-57BD-6A49-A8D8-B7EF19C631B4}" type="datetimeFigureOut">
               <a:rPr lang="en-US" smtClean="0"/>
-              <a:t>3/9/21</a:t>
+              <a:t>3/12/21</a:t>
             </a:fld>
             <a:endParaRPr lang="en-US"/>
           </a:p>
@@ -1747,7 +1750,7 @@
           <a:p>
             <a:fld id="{6ABC15E7-57BD-6A49-A8D8-B7EF19C631B4}" type="datetimeFigureOut">
               <a:rPr lang="en-US" smtClean="0"/>
-              <a:t>3/9/21</a:t>
+              <a:t>3/12/21</a:t>
             </a:fld>
             <a:endParaRPr lang="en-US"/>
           </a:p>
@@ -1842,7 +1845,7 @@
           <a:p>
             <a:fld id="{6ABC15E7-57BD-6A49-A8D8-B7EF19C631B4}" type="datetimeFigureOut">
               <a:rPr lang="en-US" smtClean="0"/>
-              <a:t>3/9/21</a:t>
+              <a:t>3/12/21</a:t>
             </a:fld>
             <a:endParaRPr lang="en-US"/>
           </a:p>
@@ -2119,7 +2122,7 @@
           <a:p>
             <a:fld id="{6ABC15E7-57BD-6A49-A8D8-B7EF19C631B4}" type="datetimeFigureOut">
               <a:rPr lang="en-US" smtClean="0"/>
-              <a:t>3/9/21</a:t>
+              <a:t>3/12/21</a:t>
             </a:fld>
             <a:endParaRPr lang="en-US"/>
           </a:p>
@@ -2376,7 +2379,7 @@
           <a:p>
             <a:fld id="{6ABC15E7-57BD-6A49-A8D8-B7EF19C631B4}" type="datetimeFigureOut">
               <a:rPr lang="en-US" smtClean="0"/>
-              <a:t>3/9/21</a:t>
+              <a:t>3/12/21</a:t>
             </a:fld>
             <a:endParaRPr lang="en-US"/>
           </a:p>
@@ -2589,7 +2592,7 @@
           <a:p>
             <a:fld id="{6ABC15E7-57BD-6A49-A8D8-B7EF19C631B4}" type="datetimeFigureOut">
               <a:rPr lang="en-US" smtClean="0"/>
-              <a:t>3/9/21</a:t>
+              <a:t>3/12/21</a:t>
             </a:fld>
             <a:endParaRPr lang="en-US"/>
           </a:p>
@@ -6383,6 +6386,405 @@
 </p:sld>
 </file>
 
+<file path=ppt/slides/slide7.xml><?xml version="1.0" encoding="utf-8"?>
+<p:sld xmlns:a="http://schemas.openxmlformats.org/drawingml/2006/main" xmlns:r="http://schemas.openxmlformats.org/officeDocument/2006/relationships" xmlns:p="http://schemas.openxmlformats.org/presentationml/2006/main">
+  <p:cSld>
+    <p:spTree>
+      <p:nvGrpSpPr>
+        <p:cNvPr id="1" name=""/>
+        <p:cNvGrpSpPr/>
+        <p:nvPr/>
+      </p:nvGrpSpPr>
+      <p:grpSpPr>
+        <a:xfrm>
+          <a:off x="0" y="0"/>
+          <a:ext cx="0" cy="0"/>
+          <a:chOff x="0" y="0"/>
+          <a:chExt cx="0" cy="0"/>
+        </a:xfrm>
+      </p:grpSpPr>
+      <p:pic>
+        <p:nvPicPr>
+          <p:cNvPr id="5" name="Picture 4">
+            <a:extLst>
+              <a:ext uri="{FF2B5EF4-FFF2-40B4-BE49-F238E27FC236}">
+                <a16:creationId xmlns:a16="http://schemas.microsoft.com/office/drawing/2014/main" id="{B4BF3217-8892-334A-9624-6100F20C6E67}"/>
+              </a:ext>
+            </a:extLst>
+          </p:cNvPr>
+          <p:cNvPicPr>
+            <a:picLocks noChangeAspect="1"/>
+          </p:cNvPicPr>
+          <p:nvPr/>
+        </p:nvPicPr>
+        <p:blipFill>
+          <a:blip r:embed="rId2"/>
+          <a:stretch>
+            <a:fillRect/>
+          </a:stretch>
+        </p:blipFill>
+        <p:spPr>
+          <a:xfrm>
+            <a:off x="2010936" y="49561"/>
+            <a:ext cx="8170127" cy="6808439"/>
+          </a:xfrm>
+          <a:prstGeom prst="rect">
+            <a:avLst/>
+          </a:prstGeom>
+        </p:spPr>
+      </p:pic>
+      <p:sp>
+        <p:nvSpPr>
+          <p:cNvPr id="6" name="Rectangle 5">
+            <a:extLst>
+              <a:ext uri="{FF2B5EF4-FFF2-40B4-BE49-F238E27FC236}">
+                <a16:creationId xmlns:a16="http://schemas.microsoft.com/office/drawing/2014/main" id="{EE914F94-DEA7-F548-B2BF-8D9397B3647F}"/>
+              </a:ext>
+            </a:extLst>
+          </p:cNvPr>
+          <p:cNvSpPr/>
+          <p:nvPr/>
+        </p:nvSpPr>
+        <p:spPr>
+          <a:xfrm>
+            <a:off x="3869473" y="947854"/>
+            <a:ext cx="4594304" cy="5073805"/>
+          </a:xfrm>
+          <a:prstGeom prst="rect">
+            <a:avLst/>
+          </a:prstGeom>
+          <a:noFill/>
+          <a:ln w="76200">
+            <a:solidFill>
+              <a:srgbClr val="FF0000"/>
+            </a:solidFill>
+          </a:ln>
+        </p:spPr>
+        <p:style>
+          <a:lnRef idx="2">
+            <a:schemeClr val="accent1">
+              <a:shade val="50000"/>
+            </a:schemeClr>
+          </a:lnRef>
+          <a:fillRef idx="1">
+            <a:schemeClr val="accent1"/>
+          </a:fillRef>
+          <a:effectRef idx="0">
+            <a:schemeClr val="accent1"/>
+          </a:effectRef>
+          <a:fontRef idx="minor">
+            <a:schemeClr val="lt1"/>
+          </a:fontRef>
+        </p:style>
+        <p:txBody>
+          <a:bodyPr rtlCol="0" anchor="ctr"/>
+          <a:lstStyle/>
+          <a:p>
+            <a:pPr algn="ctr"/>
+            <a:endParaRPr lang="en-US"/>
+          </a:p>
+        </p:txBody>
+      </p:sp>
+    </p:spTree>
+    <p:extLst>
+      <p:ext uri="{BB962C8B-B14F-4D97-AF65-F5344CB8AC3E}">
+        <p14:creationId xmlns:p14="http://schemas.microsoft.com/office/powerpoint/2010/main" val="3005283746"/>
+      </p:ext>
+    </p:extLst>
+  </p:cSld>
+  <p:clrMapOvr>
+    <a:masterClrMapping/>
+  </p:clrMapOvr>
+</p:sld>
+</file>
+
+<file path=ppt/slides/slide8.xml><?xml version="1.0" encoding="utf-8"?>
+<p:sld xmlns:a="http://schemas.openxmlformats.org/drawingml/2006/main" xmlns:r="http://schemas.openxmlformats.org/officeDocument/2006/relationships" xmlns:p="http://schemas.openxmlformats.org/presentationml/2006/main">
+  <p:cSld>
+    <p:spTree>
+      <p:nvGrpSpPr>
+        <p:cNvPr id="1" name=""/>
+        <p:cNvGrpSpPr/>
+        <p:nvPr/>
+      </p:nvGrpSpPr>
+      <p:grpSpPr>
+        <a:xfrm>
+          <a:off x="0" y="0"/>
+          <a:ext cx="0" cy="0"/>
+          <a:chOff x="0" y="0"/>
+          <a:chExt cx="0" cy="0"/>
+        </a:xfrm>
+      </p:grpSpPr>
+      <p:pic>
+        <p:nvPicPr>
+          <p:cNvPr id="5" name="Picture 4">
+            <a:extLst>
+              <a:ext uri="{FF2B5EF4-FFF2-40B4-BE49-F238E27FC236}">
+                <a16:creationId xmlns:a16="http://schemas.microsoft.com/office/drawing/2014/main" id="{B4BF3217-8892-334A-9624-6100F20C6E67}"/>
+              </a:ext>
+            </a:extLst>
+          </p:cNvPr>
+          <p:cNvPicPr>
+            <a:picLocks noChangeAspect="1"/>
+          </p:cNvPicPr>
+          <p:nvPr/>
+        </p:nvPicPr>
+        <p:blipFill>
+          <a:blip r:embed="rId2"/>
+          <a:stretch>
+            <a:fillRect/>
+          </a:stretch>
+        </p:blipFill>
+        <p:spPr>
+          <a:xfrm>
+            <a:off x="2010936" y="49561"/>
+            <a:ext cx="8170126" cy="6808439"/>
+          </a:xfrm>
+          <a:prstGeom prst="rect">
+            <a:avLst/>
+          </a:prstGeom>
+        </p:spPr>
+      </p:pic>
+      <p:sp>
+        <p:nvSpPr>
+          <p:cNvPr id="2" name="Rectangle 1">
+            <a:extLst>
+              <a:ext uri="{FF2B5EF4-FFF2-40B4-BE49-F238E27FC236}">
+                <a16:creationId xmlns:a16="http://schemas.microsoft.com/office/drawing/2014/main" id="{51FE85E4-1505-DD42-9330-55844D7CECA8}"/>
+              </a:ext>
+            </a:extLst>
+          </p:cNvPr>
+          <p:cNvSpPr/>
+          <p:nvPr/>
+        </p:nvSpPr>
+        <p:spPr>
+          <a:xfrm>
+            <a:off x="3869473" y="947854"/>
+            <a:ext cx="4594304" cy="5073805"/>
+          </a:xfrm>
+          <a:prstGeom prst="rect">
+            <a:avLst/>
+          </a:prstGeom>
+          <a:noFill/>
+          <a:ln w="76200">
+            <a:solidFill>
+              <a:srgbClr val="FF0000"/>
+            </a:solidFill>
+          </a:ln>
+        </p:spPr>
+        <p:style>
+          <a:lnRef idx="2">
+            <a:schemeClr val="accent1">
+              <a:shade val="50000"/>
+            </a:schemeClr>
+          </a:lnRef>
+          <a:fillRef idx="1">
+            <a:schemeClr val="accent1"/>
+          </a:fillRef>
+          <a:effectRef idx="0">
+            <a:schemeClr val="accent1"/>
+          </a:effectRef>
+          <a:fontRef idx="minor">
+            <a:schemeClr val="lt1"/>
+          </a:fontRef>
+        </p:style>
+        <p:txBody>
+          <a:bodyPr rtlCol="0" anchor="ctr"/>
+          <a:lstStyle/>
+          <a:p>
+            <a:pPr algn="ctr"/>
+            <a:endParaRPr lang="en-US"/>
+          </a:p>
+        </p:txBody>
+      </p:sp>
+    </p:spTree>
+    <p:extLst>
+      <p:ext uri="{BB962C8B-B14F-4D97-AF65-F5344CB8AC3E}">
+        <p14:creationId xmlns:p14="http://schemas.microsoft.com/office/powerpoint/2010/main" val="1047796992"/>
+      </p:ext>
+    </p:extLst>
+  </p:cSld>
+  <p:clrMapOvr>
+    <a:masterClrMapping/>
+  </p:clrMapOvr>
+</p:sld>
+</file>
+
+<file path=ppt/slides/slide9.xml><?xml version="1.0" encoding="utf-8"?>
+<p:sld xmlns:a="http://schemas.openxmlformats.org/drawingml/2006/main" xmlns:r="http://schemas.openxmlformats.org/officeDocument/2006/relationships" xmlns:p="http://schemas.openxmlformats.org/presentationml/2006/main">
+  <p:cSld>
+    <p:spTree>
+      <p:nvGrpSpPr>
+        <p:cNvPr id="1" name=""/>
+        <p:cNvGrpSpPr/>
+        <p:nvPr/>
+      </p:nvGrpSpPr>
+      <p:grpSpPr>
+        <a:xfrm>
+          <a:off x="0" y="0"/>
+          <a:ext cx="0" cy="0"/>
+          <a:chOff x="0" y="0"/>
+          <a:chExt cx="0" cy="0"/>
+        </a:xfrm>
+      </p:grpSpPr>
+      <p:sp>
+        <p:nvSpPr>
+          <p:cNvPr id="2" name="Title 1">
+            <a:extLst>
+              <a:ext uri="{FF2B5EF4-FFF2-40B4-BE49-F238E27FC236}">
+                <a16:creationId xmlns:a16="http://schemas.microsoft.com/office/drawing/2014/main" id="{59918260-20E7-1F40-8EBC-A4BEE88C5241}"/>
+              </a:ext>
+            </a:extLst>
+          </p:cNvPr>
+          <p:cNvSpPr>
+            <a:spLocks noGrp="1"/>
+          </p:cNvSpPr>
+          <p:nvPr>
+            <p:ph type="title"/>
+          </p:nvPr>
+        </p:nvSpPr>
+        <p:spPr/>
+        <p:txBody>
+          <a:bodyPr/>
+          <a:lstStyle/>
+          <a:p>
+            <a:r>
+              <a:rPr lang="en-US" dirty="0"/>
+              <a:t>Moving source motor instead of linear</a:t>
+            </a:r>
+          </a:p>
+        </p:txBody>
+      </p:sp>
+      <p:sp>
+        <p:nvSpPr>
+          <p:cNvPr id="3" name="Content Placeholder 2">
+            <a:extLst>
+              <a:ext uri="{FF2B5EF4-FFF2-40B4-BE49-F238E27FC236}">
+                <a16:creationId xmlns:a16="http://schemas.microsoft.com/office/drawing/2014/main" id="{F9F372F9-58BA-4546-BC8B-F220B78BA679}"/>
+              </a:ext>
+            </a:extLst>
+          </p:cNvPr>
+          <p:cNvSpPr>
+            <a:spLocks noGrp="1"/>
+          </p:cNvSpPr>
+          <p:nvPr>
+            <p:ph idx="1"/>
+          </p:nvPr>
+        </p:nvSpPr>
+        <p:spPr/>
+        <p:txBody>
+          <a:bodyPr/>
+          <a:lstStyle/>
+          <a:p>
+            <a:r>
+              <a:rPr lang="en-US" dirty="0"/>
+              <a:t>To get spot at 12 mm radius with the source centered above the p+ contact (</a:t>
+            </a:r>
+            <a:r>
+              <a:rPr lang="en-US" dirty="0" err="1"/>
+              <a:t>ie</a:t>
+            </a:r>
+            <a:r>
+              <a:rPr lang="en-US" dirty="0"/>
+              <a:t> linear motor centered) should rotate to:</a:t>
+            </a:r>
+          </a:p>
+          <a:p>
+            <a:pPr lvl="1"/>
+            <a:r>
+              <a:rPr lang="en-US" dirty="0"/>
+              <a:t>rotate collimator to: 28.61 </a:t>
+            </a:r>
+            <a:r>
+              <a:rPr lang="en-US" dirty="0" err="1"/>
+              <a:t>deg</a:t>
+            </a:r>
+            <a:endParaRPr lang="en-US" dirty="0"/>
+          </a:p>
+          <a:p>
+            <a:pPr lvl="1"/>
+            <a:r>
+              <a:rPr lang="en-US" dirty="0" err="1"/>
+              <a:t>theta_rot</a:t>
+            </a:r>
+            <a:r>
+              <a:rPr lang="en-US" dirty="0"/>
+              <a:t> = 28.61 </a:t>
+            </a:r>
+            <a:r>
+              <a:rPr lang="en-US" dirty="0" err="1"/>
+              <a:t>deg</a:t>
+            </a:r>
+            <a:r>
+              <a:rPr lang="en-US" dirty="0"/>
+              <a:t> corresponds to </a:t>
+            </a:r>
+            <a:r>
+              <a:rPr lang="en-US" dirty="0" err="1"/>
+              <a:t>theta_det</a:t>
+            </a:r>
+            <a:r>
+              <a:rPr lang="en-US" dirty="0"/>
+              <a:t> = 61.39 </a:t>
+            </a:r>
+          </a:p>
+          <a:p>
+            <a:pPr lvl="1"/>
+            <a:endParaRPr lang="en-US" dirty="0"/>
+          </a:p>
+          <a:p>
+            <a:r>
+              <a:rPr lang="en-US" dirty="0"/>
+              <a:t>For simplicity: </a:t>
+            </a:r>
+          </a:p>
+          <a:p>
+            <a:pPr lvl="1"/>
+            <a:r>
+              <a:rPr lang="en-US" dirty="0"/>
+              <a:t>Rotate source motor to 29 </a:t>
+            </a:r>
+            <a:r>
+              <a:rPr lang="en-US" dirty="0" err="1"/>
+              <a:t>deg</a:t>
+            </a:r>
+            <a:r>
+              <a:rPr lang="en-US" dirty="0"/>
+              <a:t> -&gt; </a:t>
+            </a:r>
+            <a:r>
+              <a:rPr lang="en-US" dirty="0" err="1"/>
+              <a:t>theta_det</a:t>
+            </a:r>
+            <a:r>
+              <a:rPr lang="en-US" dirty="0"/>
+              <a:t> = 61 </a:t>
+            </a:r>
+            <a:r>
+              <a:rPr lang="en-US"/>
+              <a:t>deg</a:t>
+            </a:r>
+            <a:endParaRPr lang="en-US" dirty="0"/>
+          </a:p>
+          <a:p>
+            <a:pPr lvl="1"/>
+            <a:endParaRPr lang="en-US" dirty="0"/>
+          </a:p>
+        </p:txBody>
+      </p:sp>
+    </p:spTree>
+    <p:extLst>
+      <p:ext uri="{BB962C8B-B14F-4D97-AF65-F5344CB8AC3E}">
+        <p14:creationId xmlns:p14="http://schemas.microsoft.com/office/powerpoint/2010/main" val="555657053"/>
+      </p:ext>
+    </p:extLst>
+  </p:cSld>
+  <p:clrMapOvr>
+    <a:masterClrMapping/>
+  </p:clrMapOvr>
+</p:sld>
+</file>
+
 <file path=ppt/theme/theme1.xml><?xml version="1.0" encoding="utf-8"?>
 <a:theme xmlns:a="http://schemas.openxmlformats.org/drawingml/2006/main" name="Office Theme">
   <a:themeElements>

</xml_diff>